<commit_message>
Minor Updates to Second PPT
</commit_message>
<xml_diff>
--- a/Presentations/EC551SecondProjectPresentation.pptx
+++ b/Presentations/EC551SecondProjectPresentation.pptx
@@ -7871,7 +7871,7 @@
         <p:spPr/>
         <p:txBody>
           <a:bodyPr>
-            <a:normAutofit/>
+            <a:normAutofit lnSpcReduction="10000"/>
           </a:bodyPr>
           <a:lstStyle/>
           <a:p>
@@ -7893,7 +7893,34 @@
               </a:spcBef>
               <a:buSzPts val="1200"/>
             </a:pPr>
-            <a:endParaRPr lang="en-US" sz="1600" dirty="0"/>
+            <a:r>
+              <a:rPr lang="en-US" sz="1600" dirty="0"/>
+              <a:t>Change out button input for ADC output [11/11]</a:t>
+            </a:r>
+          </a:p>
+          <a:p>
+            <a:pPr lvl="2" indent="-406390">
+              <a:spcBef>
+                <a:spcPts val="133"/>
+              </a:spcBef>
+              <a:buSzPts val="1200"/>
+            </a:pPr>
+            <a:r>
+              <a:rPr lang="en-US" sz="1600" dirty="0"/>
+              <a:t>Start with simple threshold and maintain single step of paddle</a:t>
+            </a:r>
+          </a:p>
+          <a:p>
+            <a:pPr lvl="1" indent="-406390">
+              <a:spcBef>
+                <a:spcPts val="133"/>
+              </a:spcBef>
+              <a:buSzPts val="1200"/>
+            </a:pPr>
+            <a:r>
+              <a:rPr lang="en-US" sz="1600" dirty="0"/>
+              <a:t>Change from single step to step proportional to ADC output [11/18]</a:t>
+            </a:r>
           </a:p>
           <a:p>
             <a:pPr indent="-423323">
@@ -8405,7 +8432,7 @@
             </a:pPr>
             <a:r>
               <a:rPr lang="en-US" sz="1400" dirty="0"/>
-              <a:t>User will have two input sensors, one which will make the paddle go up and the other to make it go down.</a:t>
+              <a:t>User will have two input sensors, one which will make the paddle go left and the other to make it go right.</a:t>
             </a:r>
           </a:p>
           <a:p>
@@ -8416,7 +8443,7 @@
             </a:pPr>
             <a:r>
               <a:rPr lang="en-US" sz="1400" dirty="0"/>
-              <a:t>The harder the user presses on a given sensor, the faster the paddle will move up or down.</a:t>
+              <a:t>The harder the user presses on a given sensor, the faster the paddle will move.</a:t>
             </a:r>
           </a:p>
           <a:p>
@@ -8630,8 +8657,8 @@
         </p:blipFill>
         <p:spPr>
           <a:xfrm>
-            <a:off x="9134580" y="4555222"/>
-            <a:ext cx="2939831" cy="2000800"/>
+            <a:off x="8597134" y="4189445"/>
+            <a:ext cx="3477277" cy="2366577"/>
           </a:xfrm>
           <a:prstGeom prst="rect">
             <a:avLst/>
@@ -8957,34 +8984,6 @@
           </a:p>
         </p:txBody>
       </p:sp>
-      <p:sp>
-        <p:nvSpPr>
-          <p:cNvPr id="3" name="Text Placeholder 2">
-            <a:extLst>
-              <a:ext uri="{FF2B5EF4-FFF2-40B4-BE49-F238E27FC236}">
-                <a16:creationId xmlns:a16="http://schemas.microsoft.com/office/drawing/2014/main" id="{ECA3DEAF-101F-482D-9412-FB0B05FDDF20}"/>
-              </a:ext>
-            </a:extLst>
-          </p:cNvPr>
-          <p:cNvSpPr>
-            <a:spLocks noGrp="1"/>
-          </p:cNvSpPr>
-          <p:nvPr>
-            <p:ph type="body" idx="1"/>
-          </p:nvPr>
-        </p:nvSpPr>
-        <p:spPr/>
-        <p:txBody>
-          <a:bodyPr/>
-          <a:lstStyle/>
-          <a:p>
-            <a:r>
-              <a:rPr lang="en-US" dirty="0"/>
-              <a:t>Insert video of ADC working</a:t>
-            </a:r>
-          </a:p>
-        </p:txBody>
-      </p:sp>
       <p:pic>
         <p:nvPicPr>
           <p:cNvPr id="4" name="Picture 3">
@@ -9000,7 +8999,7 @@
           <p:nvPr/>
         </p:nvPicPr>
         <p:blipFill>
-          <a:blip r:embed="rId2"/>
+          <a:blip r:embed="rId3"/>
           <a:stretch>
             <a:fillRect/>
           </a:stretch>
@@ -9030,7 +9029,7 @@
           <p:nvPr/>
         </p:nvPicPr>
         <p:blipFill>
-          <a:blip r:embed="rId3"/>
+          <a:blip r:embed="rId4"/>
           <a:stretch>
             <a:fillRect/>
           </a:stretch>
@@ -9039,6 +9038,39 @@
           <a:xfrm>
             <a:off x="8161704" y="1510532"/>
             <a:ext cx="3408480" cy="2052418"/>
+          </a:xfrm>
+          <a:prstGeom prst="rect">
+            <a:avLst/>
+          </a:prstGeom>
+        </p:spPr>
+      </p:pic>
+      <p:pic>
+        <p:nvPicPr>
+          <p:cNvPr id="6" name="Online Media 5" title="Force Sensitive Resistor Testing on NEXYS A7 Board">
+            <a:hlinkClick r:id="" action="ppaction://media"/>
+            <a:extLst>
+              <a:ext uri="{FF2B5EF4-FFF2-40B4-BE49-F238E27FC236}">
+                <a16:creationId xmlns:a16="http://schemas.microsoft.com/office/drawing/2014/main" id="{CF3659C9-6891-56AC-0523-ED97BE34F75F}"/>
+              </a:ext>
+            </a:extLst>
+          </p:cNvPr>
+          <p:cNvPicPr>
+            <a:picLocks noRot="1" noChangeAspect="1"/>
+          </p:cNvPicPr>
+          <p:nvPr>
+            <a:videoFile r:link="rId1"/>
+          </p:nvPr>
+        </p:nvPicPr>
+        <p:blipFill>
+          <a:blip r:embed="rId5"/>
+          <a:stretch>
+            <a:fillRect/>
+          </a:stretch>
+        </p:blipFill>
+        <p:spPr>
+          <a:xfrm>
+            <a:off x="1668101" y="2730605"/>
+            <a:ext cx="5786678" cy="3269473"/>
           </a:xfrm>
           <a:prstGeom prst="rect">
             <a:avLst/>
@@ -9055,6 +9087,141 @@
   <p:clrMapOvr>
     <a:masterClrMapping/>
   </p:clrMapOvr>
+  <p:timing>
+    <p:tnLst>
+      <p:par>
+        <p:cTn id="1" dur="indefinite" restart="never" nodeType="tmRoot">
+          <p:childTnLst>
+            <p:seq concurrent="1" nextAc="seek">
+              <p:cTn id="2" dur="indefinite" nodeType="mainSeq">
+                <p:childTnLst>
+                  <p:par>
+                    <p:cTn id="3" fill="hold">
+                      <p:stCondLst>
+                        <p:cond delay="indefinite"/>
+                      </p:stCondLst>
+                      <p:childTnLst>
+                        <p:par>
+                          <p:cTn id="4" fill="hold">
+                            <p:stCondLst>
+                              <p:cond delay="0"/>
+                            </p:stCondLst>
+                            <p:childTnLst>
+                              <p:par>
+                                <p:cTn id="5" presetID="1" presetClass="mediacall" presetSubtype="0" fill="hold" nodeType="clickEffect">
+                                  <p:stCondLst>
+                                    <p:cond delay="0"/>
+                                  </p:stCondLst>
+                                  <p:childTnLst>
+                                    <p:cmd type="call" cmd="playFrom(0.0)">
+                                      <p:cBhvr>
+                                        <p:cTn id="6" dur="1" fill="hold"/>
+                                        <p:tgtEl>
+                                          <p:spTgt spid="6"/>
+                                        </p:tgtEl>
+                                      </p:cBhvr>
+                                    </p:cmd>
+                                  </p:childTnLst>
+                                </p:cTn>
+                              </p:par>
+                            </p:childTnLst>
+                          </p:cTn>
+                        </p:par>
+                      </p:childTnLst>
+                    </p:cTn>
+                  </p:par>
+                </p:childTnLst>
+              </p:cTn>
+              <p:prevCondLst>
+                <p:cond evt="onPrev" delay="0">
+                  <p:tgtEl>
+                    <p:sldTgt/>
+                  </p:tgtEl>
+                </p:cond>
+              </p:prevCondLst>
+              <p:nextCondLst>
+                <p:cond evt="onNext" delay="0">
+                  <p:tgtEl>
+                    <p:sldTgt/>
+                  </p:tgtEl>
+                </p:cond>
+              </p:nextCondLst>
+            </p:seq>
+            <p:video>
+              <p:cMediaNode vol="80000">
+                <p:cTn id="7" fill="hold" display="0">
+                  <p:stCondLst>
+                    <p:cond delay="indefinite"/>
+                  </p:stCondLst>
+                </p:cTn>
+                <p:tgtEl>
+                  <p:spTgt spid="6"/>
+                </p:tgtEl>
+              </p:cMediaNode>
+            </p:video>
+            <p:seq concurrent="1" nextAc="seek">
+              <p:cTn id="8" restart="whenNotActive" fill="hold" evtFilter="cancelBubble" nodeType="interactiveSeq">
+                <p:stCondLst>
+                  <p:cond evt="onClick" delay="0">
+                    <p:tgtEl>
+                      <p:spTgt spid="6"/>
+                    </p:tgtEl>
+                  </p:cond>
+                </p:stCondLst>
+                <p:endSync evt="end" delay="0">
+                  <p:rtn val="all"/>
+                </p:endSync>
+                <p:childTnLst>
+                  <p:par>
+                    <p:cTn id="9" fill="hold">
+                      <p:stCondLst>
+                        <p:cond delay="0"/>
+                      </p:stCondLst>
+                      <p:childTnLst>
+                        <p:par>
+                          <p:cTn id="10" fill="hold">
+                            <p:stCondLst>
+                              <p:cond delay="0"/>
+                            </p:stCondLst>
+                            <p:childTnLst>
+                              <p:par>
+                                <p:cTn id="11" presetID="2" presetClass="mediacall" presetSubtype="0" fill="hold" nodeType="clickEffect">
+                                  <p:stCondLst>
+                                    <p:cond delay="0"/>
+                                  </p:stCondLst>
+                                  <p:childTnLst>
+                                    <p:cmd type="call" cmd="togglePause">
+                                      <p:cBhvr>
+                                        <p:cTn id="12" dur="1" fill="hold"/>
+                                        <p:tgtEl>
+                                          <p:spTgt spid="6"/>
+                                        </p:tgtEl>
+                                      </p:cBhvr>
+                                    </p:cmd>
+                                  </p:childTnLst>
+                                </p:cTn>
+                              </p:par>
+                            </p:childTnLst>
+                          </p:cTn>
+                        </p:par>
+                      </p:childTnLst>
+                    </p:cTn>
+                  </p:par>
+                </p:childTnLst>
+              </p:cTn>
+              <p:nextCondLst>
+                <p:cond evt="onClick" delay="0">
+                  <p:tgtEl>
+                    <p:spTgt spid="6"/>
+                  </p:tgtEl>
+                </p:cond>
+              </p:nextCondLst>
+            </p:seq>
+          </p:childTnLst>
+        </p:cTn>
+      </p:par>
+    </p:tnLst>
+  </p:timing>
 </p:sld>
 </file>
 
@@ -9123,22 +9290,36 @@
         </p:nvSpPr>
         <p:spPr/>
         <p:txBody>
-          <a:bodyPr/>
+          <a:bodyPr>
+            <a:normAutofit/>
+          </a:bodyPr>
           <a:lstStyle/>
           <a:p>
             <a:r>
-              <a:rPr lang="en-US" dirty="0"/>
+              <a:rPr lang="en-US" sz="2400" dirty="0"/>
               <a:t>ADC code working</a:t>
             </a:r>
           </a:p>
           <a:p>
             <a:r>
-              <a:rPr lang="en-US" dirty="0"/>
+              <a:rPr lang="en-US" sz="2400" dirty="0"/>
               <a:t>Force sensitive resistors working</a:t>
             </a:r>
           </a:p>
           <a:p>
-            <a:endParaRPr lang="en-US" dirty="0"/>
+            <a:r>
+              <a:rPr lang="en-US" sz="2400" dirty="0"/>
+              <a:t>Game code works</a:t>
+            </a:r>
+          </a:p>
+          <a:p>
+            <a:r>
+              <a:rPr lang="en-US" sz="2400" dirty="0"/>
+              <a:t>Game video is displaying over VGA</a:t>
+            </a:r>
+          </a:p>
+          <a:p>
+            <a:endParaRPr lang="en-US" sz="2400" dirty="0"/>
           </a:p>
         </p:txBody>
       </p:sp>

</xml_diff>